<commit_message>
added img folder, set up logic for adding images to slides
</commit_message>
<xml_diff>
--- a/CN_PPT_Sofia.pptx
+++ b/CN_PPT_Sofia.pptx
@@ -8,6 +8,7 @@
     <p:sldId id="256" r:id="rId7"/>
     <p:sldId id="257" r:id="rId8"/>
     <p:sldId id="258" r:id="rId9"/>
+    <p:sldId id="259" r:id="rId10"/>
   </p:sldIdLst>
   <p:sldSz cx="9144000" cy="6858000" type="screen4x3"/>
   <p:notesSz cx="6858000" cy="9144000"/>
@@ -3251,6 +3252,125 @@
           <a:p>
             <a:r>
               <a:t>Are you ready to RUUUMBLE?! - Python vs JavaScript</a:t>
+            </a:r>
+          </a:p>
+        </p:txBody>
+      </p:sp>
+      <p:sp>
+        <p:nvSpPr>
+          <p:cNvPr id="3" name="TextBox 2"/>
+          <p:cNvSpPr txBox="1"/>
+          <p:nvPr/>
+        </p:nvSpPr>
+        <p:spPr>
+          <a:xfrm>
+            <a:off x="2743200" y="1828800"/>
+            <a:ext cx="914400" cy="914400"/>
+          </a:xfrm>
+          <a:prstGeom prst="rect">
+            <a:avLst/>
+          </a:prstGeom>
+          <a:noFill/>
+        </p:spPr>
+        <p:txBody>
+          <a:bodyPr wrap="none">
+            <a:spAutoFit/>
+          </a:bodyPr>
+          <a:lstStyle/>
+          <a:p/>
+          <a:p>
+            <a:pPr>
+              <a:defRPr b="1" sz="3000"/>
+            </a:pPr>
+            <a:r>
+              <a:t>Naming Conventions</a:t>
+            </a:r>
+          </a:p>
+        </p:txBody>
+      </p:sp>
+      <p:pic>
+        <p:nvPicPr>
+          <p:cNvPr id="4" name="Picture 3" descr="naming_js.PNG"/>
+          <p:cNvPicPr>
+            <a:picLocks noChangeAspect="1"/>
+          </p:cNvPicPr>
+          <p:nvPr/>
+        </p:nvPicPr>
+        <p:blipFill>
+          <a:blip r:embed="rId2"/>
+          <a:stretch>
+            <a:fillRect/>
+          </a:stretch>
+        </p:blipFill>
+        <p:spPr>
+          <a:xfrm>
+            <a:off x="1371600" y="3657600"/>
+            <a:ext cx="2419350" cy="666750"/>
+          </a:xfrm>
+          <a:prstGeom prst="rect">
+            <a:avLst/>
+          </a:prstGeom>
+        </p:spPr>
+      </p:pic>
+      <p:pic>
+        <p:nvPicPr>
+          <p:cNvPr id="5" name="Picture 4" descr="naming_py.PNG"/>
+          <p:cNvPicPr>
+            <a:picLocks noChangeAspect="1"/>
+          </p:cNvPicPr>
+          <p:nvPr/>
+        </p:nvPicPr>
+        <p:blipFill>
+          <a:blip r:embed="rId3"/>
+          <a:stretch>
+            <a:fillRect/>
+          </a:stretch>
+        </p:blipFill>
+        <p:spPr>
+          <a:xfrm>
+            <a:off x="5029200" y="3657600"/>
+            <a:ext cx="2562225" cy="638175"/>
+          </a:xfrm>
+          <a:prstGeom prst="rect">
+            <a:avLst/>
+          </a:prstGeom>
+        </p:spPr>
+      </p:pic>
+    </p:spTree>
+  </p:cSld>
+  <p:clrMapOvr>
+    <a:masterClrMapping/>
+  </p:clrMapOvr>
+</p:sld>
+</file>
+
+<file path=ppt/slides/slide4.xml><?xml version="1.0" encoding="utf-8"?>
+<p:sld xmlns:a="http://schemas.openxmlformats.org/drawingml/2006/main" xmlns:p="http://schemas.openxmlformats.org/presentationml/2006/main" xmlns:r="http://schemas.openxmlformats.org/officeDocument/2006/relationships">
+  <p:cSld>
+    <p:spTree>
+      <p:nvGrpSpPr>
+        <p:cNvPr id="1" name=""/>
+        <p:cNvGrpSpPr/>
+        <p:nvPr/>
+      </p:nvGrpSpPr>
+      <p:grpSpPr/>
+      <p:sp>
+        <p:nvSpPr>
+          <p:cNvPr id="2" name="Title 1"/>
+          <p:cNvSpPr>
+            <a:spLocks noGrp="1"/>
+          </p:cNvSpPr>
+          <p:nvPr>
+            <p:ph type="title"/>
+          </p:nvPr>
+        </p:nvSpPr>
+        <p:spPr/>
+        <p:txBody>
+          <a:bodyPr/>
+          <a:lstStyle/>
+          <a:p>
+            <a:r>
+              <a:t>And now, for something completely different...</a:t>
             </a:r>
           </a:p>
         </p:txBody>

</xml_diff>

<commit_message>
added background colour to slides, finished slides logic
</commit_message>
<xml_diff>
--- a/CN_PPT_Sofia.pptx
+++ b/CN_PPT_Sofia.pptx
@@ -9,6 +9,11 @@
     <p:sldId id="257" r:id="rId8"/>
     <p:sldId id="258" r:id="rId9"/>
     <p:sldId id="259" r:id="rId10"/>
+    <p:sldId id="260" r:id="rId11"/>
+    <p:sldId id="261" r:id="rId12"/>
+    <p:sldId id="262" r:id="rId13"/>
+    <p:sldId id="263" r:id="rId14"/>
+    <p:sldId id="264" r:id="rId15"/>
   </p:sldIdLst>
   <p:sldSz cx="9144000" cy="6858000" type="screen4x3"/>
   <p:notesSz cx="6858000" cy="9144000"/>
@@ -3084,6 +3089,14 @@
 <file path=ppt/slides/slide1.xml><?xml version="1.0" encoding="utf-8"?>
 <p:sld xmlns:a="http://schemas.openxmlformats.org/drawingml/2006/main" xmlns:p="http://schemas.openxmlformats.org/presentationml/2006/main" xmlns:r="http://schemas.openxmlformats.org/officeDocument/2006/relationships">
   <p:cSld>
+    <p:bg>
+      <p:bgPr>
+        <a:solidFill>
+          <a:srgbClr val="B4CEE4"/>
+        </a:solidFill>
+        <a:effectLst/>
+      </p:bgPr>
+    </p:bg>
     <p:spTree>
       <p:nvGrpSpPr>
         <p:cNvPr id="1" name=""/>
@@ -3093,40 +3106,70 @@
       <p:grpSpPr/>
       <p:sp>
         <p:nvSpPr>
-          <p:cNvPr id="2" name="Title 1"/>
-          <p:cNvSpPr>
-            <a:spLocks noGrp="1"/>
-          </p:cNvSpPr>
-          <p:nvPr>
-            <p:ph type="ctrTitle"/>
-          </p:nvPr>
-        </p:nvSpPr>
-        <p:spPr/>
-        <p:txBody>
-          <a:bodyPr/>
-          <a:lstStyle/>
-          <a:p>
-            <a:r>
-              <a:t>print('Python')</a:t>
-            </a:r>
-          </a:p>
-        </p:txBody>
-      </p:sp>
-      <p:sp>
-        <p:nvSpPr>
-          <p:cNvPr id="3" name="Subtitle 2"/>
-          <p:cNvSpPr>
-            <a:spLocks noGrp="1"/>
-          </p:cNvSpPr>
-          <p:nvPr>
-            <p:ph type="subTitle" idx="1"/>
-          </p:nvPr>
-        </p:nvSpPr>
-        <p:spPr/>
-        <p:txBody>
-          <a:bodyPr/>
-          <a:lstStyle/>
-          <a:p>
+          <p:cNvPr id="2" name="TextBox 1"/>
+          <p:cNvSpPr txBox="1"/>
+          <p:nvPr/>
+        </p:nvSpPr>
+        <p:spPr>
+          <a:xfrm>
+            <a:off x="2286000" y="1828800"/>
+            <a:ext cx="914400" cy="914400"/>
+          </a:xfrm>
+          <a:prstGeom prst="rect">
+            <a:avLst/>
+          </a:prstGeom>
+          <a:noFill/>
+        </p:spPr>
+        <p:txBody>
+          <a:bodyPr wrap="none">
+            <a:spAutoFit/>
+          </a:bodyPr>
+          <a:lstStyle/>
+          <a:p/>
+          <a:p>
+            <a:pPr>
+              <a:defRPr b="1" sz="5000">
+                <a:solidFill>
+                  <a:srgbClr val="000000"/>
+                </a:solidFill>
+              </a:defRPr>
+            </a:pPr>
+            <a:r>
+              <a:t>print("Python")</a:t>
+            </a:r>
+          </a:p>
+        </p:txBody>
+      </p:sp>
+      <p:sp>
+        <p:nvSpPr>
+          <p:cNvPr id="3" name="TextBox 2"/>
+          <p:cNvSpPr txBox="1"/>
+          <p:nvPr/>
+        </p:nvSpPr>
+        <p:spPr>
+          <a:xfrm>
+            <a:off x="1371600" y="3657600"/>
+            <a:ext cx="914400" cy="914400"/>
+          </a:xfrm>
+          <a:prstGeom prst="rect">
+            <a:avLst/>
+          </a:prstGeom>
+          <a:noFill/>
+        </p:spPr>
+        <p:txBody>
+          <a:bodyPr wrap="none">
+            <a:spAutoFit/>
+          </a:bodyPr>
+          <a:lstStyle/>
+          <a:p/>
+          <a:p>
+            <a:pPr>
+              <a:defRPr b="1" sz="3000">
+                <a:solidFill>
+                  <a:srgbClr val="000000"/>
+                </a:solidFill>
+              </a:defRPr>
+            </a:pPr>
             <a:r>
               <a:t>For those seeking a simpler way of life...</a:t>
             </a:r>
@@ -3144,6 +3187,14 @@
 <file path=ppt/slides/slide2.xml><?xml version="1.0" encoding="utf-8"?>
 <p:sld xmlns:a="http://schemas.openxmlformats.org/drawingml/2006/main" xmlns:p="http://schemas.openxmlformats.org/presentationml/2006/main" xmlns:r="http://schemas.openxmlformats.org/officeDocument/2006/relationships">
   <p:cSld>
+    <p:bg>
+      <p:bgPr>
+        <a:solidFill>
+          <a:srgbClr val="FDEFB4"/>
+        </a:solidFill>
+        <a:effectLst/>
+      </p:bgPr>
+    </p:bg>
     <p:spTree>
       <p:nvGrpSpPr>
         <p:cNvPr id="1" name=""/>
@@ -3186,31 +3237,43 @@
         <p:txBody>
           <a:bodyPr/>
           <a:lstStyle/>
-          <a:p>
+          <a:p/>
+          <a:p>
+            <a:pPr>
+              <a:defRPr sz="2500"/>
+            </a:pPr>
             <a:r>
               <a:t>Released in 1991</a:t>
             </a:r>
           </a:p>
           <a:p>
-            <a:pPr/>
+            <a:pPr>
+              <a:defRPr sz="2500"/>
+            </a:pPr>
             <a:r>
               <a:t>Python is an object-oriented programming language (OOP)</a:t>
             </a:r>
           </a:p>
           <a:p>
-            <a:pPr/>
+            <a:pPr>
+              <a:defRPr sz="2500"/>
+            </a:pPr>
             <a:r>
               <a:t>Beginner-friendly due to its simpler syntax - write programs with fewer lines of code</a:t>
             </a:r>
           </a:p>
           <a:p>
-            <a:pPr/>
+            <a:pPr>
+              <a:defRPr sz="2500"/>
+            </a:pPr>
             <a:r>
               <a:t>Not only used by software engineers - also by mathmatecians, data analysts, scientists, accountants and network engineers</a:t>
             </a:r>
           </a:p>
           <a:p>
-            <a:pPr/>
+            <a:pPr>
+              <a:defRPr sz="2500"/>
+            </a:pPr>
             <a:r>
               <a:t>One of the most popular programming languages in the world!</a:t>
             </a:r>
@@ -3228,6 +3291,14 @@
 <file path=ppt/slides/slide3.xml><?xml version="1.0" encoding="utf-8"?>
 <p:sld xmlns:a="http://schemas.openxmlformats.org/drawingml/2006/main" xmlns:p="http://schemas.openxmlformats.org/presentationml/2006/main" xmlns:r="http://schemas.openxmlformats.org/officeDocument/2006/relationships">
   <p:cSld>
+    <p:bg>
+      <p:bgPr>
+        <a:solidFill>
+          <a:srgbClr val="B4CEE4"/>
+        </a:solidFill>
+        <a:effectLst/>
+      </p:bgPr>
+    </p:bg>
     <p:spTree>
       <p:nvGrpSpPr>
         <p:cNvPr id="1" name=""/>
@@ -3347,6 +3418,14 @@
 <file path=ppt/slides/slide4.xml><?xml version="1.0" encoding="utf-8"?>
 <p:sld xmlns:a="http://schemas.openxmlformats.org/drawingml/2006/main" xmlns:p="http://schemas.openxmlformats.org/presentationml/2006/main" xmlns:r="http://schemas.openxmlformats.org/officeDocument/2006/relationships">
   <p:cSld>
+    <p:bg>
+      <p:bgPr>
+        <a:solidFill>
+          <a:srgbClr val="FDEFB4"/>
+        </a:solidFill>
+        <a:effectLst/>
+      </p:bgPr>
+    </p:bg>
     <p:spTree>
       <p:nvGrpSpPr>
         <p:cNvPr id="1" name=""/>
@@ -3370,11 +3449,742 @@
           <a:lstStyle/>
           <a:p>
             <a:r>
+              <a:t>Are you ready to RUUUMBLE?! - Python vs JavaScript</a:t>
+            </a:r>
+          </a:p>
+        </p:txBody>
+      </p:sp>
+      <p:sp>
+        <p:nvSpPr>
+          <p:cNvPr id="3" name="TextBox 2"/>
+          <p:cNvSpPr txBox="1"/>
+          <p:nvPr/>
+        </p:nvSpPr>
+        <p:spPr>
+          <a:xfrm>
+            <a:off x="3383280" y="1828800"/>
+            <a:ext cx="914400" cy="914400"/>
+          </a:xfrm>
+          <a:prstGeom prst="rect">
+            <a:avLst/>
+          </a:prstGeom>
+          <a:noFill/>
+        </p:spPr>
+        <p:txBody>
+          <a:bodyPr wrap="none">
+            <a:spAutoFit/>
+          </a:bodyPr>
+          <a:lstStyle/>
+          <a:p/>
+          <a:p>
+            <a:pPr>
+              <a:defRPr b="1" sz="3000"/>
+            </a:pPr>
+            <a:r>
+              <a:t>Code Blocks</a:t>
+            </a:r>
+          </a:p>
+        </p:txBody>
+      </p:sp>
+      <p:pic>
+        <p:nvPicPr>
+          <p:cNvPr id="4" name="Picture 3" descr="code_block_js.PNG"/>
+          <p:cNvPicPr>
+            <a:picLocks noChangeAspect="1"/>
+          </p:cNvPicPr>
+          <p:nvPr/>
+        </p:nvPicPr>
+        <p:blipFill>
+          <a:blip r:embed="rId2"/>
+          <a:stretch>
+            <a:fillRect/>
+          </a:stretch>
+        </p:blipFill>
+        <p:spPr>
+          <a:xfrm>
+            <a:off x="1828800" y="2743200"/>
+            <a:ext cx="5295900" cy="1590675"/>
+          </a:xfrm>
+          <a:prstGeom prst="rect">
+            <a:avLst/>
+          </a:prstGeom>
+        </p:spPr>
+      </p:pic>
+      <p:pic>
+        <p:nvPicPr>
+          <p:cNvPr id="5" name="Picture 4" descr="code_block_py.PNG"/>
+          <p:cNvPicPr>
+            <a:picLocks noChangeAspect="1"/>
+          </p:cNvPicPr>
+          <p:nvPr/>
+        </p:nvPicPr>
+        <p:blipFill>
+          <a:blip r:embed="rId3"/>
+          <a:stretch>
+            <a:fillRect/>
+          </a:stretch>
+        </p:blipFill>
+        <p:spPr>
+          <a:xfrm>
+            <a:off x="2103120" y="5029200"/>
+            <a:ext cx="4791075" cy="1323975"/>
+          </a:xfrm>
+          <a:prstGeom prst="rect">
+            <a:avLst/>
+          </a:prstGeom>
+        </p:spPr>
+      </p:pic>
+    </p:spTree>
+  </p:cSld>
+  <p:clrMapOvr>
+    <a:masterClrMapping/>
+  </p:clrMapOvr>
+</p:sld>
+</file>
+
+<file path=ppt/slides/slide5.xml><?xml version="1.0" encoding="utf-8"?>
+<p:sld xmlns:a="http://schemas.openxmlformats.org/drawingml/2006/main" xmlns:p="http://schemas.openxmlformats.org/presentationml/2006/main" xmlns:r="http://schemas.openxmlformats.org/officeDocument/2006/relationships">
+  <p:cSld>
+    <p:bg>
+      <p:bgPr>
+        <a:solidFill>
+          <a:srgbClr val="B4CEE4"/>
+        </a:solidFill>
+        <a:effectLst/>
+      </p:bgPr>
+    </p:bg>
+    <p:spTree>
+      <p:nvGrpSpPr>
+        <p:cNvPr id="1" name=""/>
+        <p:cNvGrpSpPr/>
+        <p:nvPr/>
+      </p:nvGrpSpPr>
+      <p:grpSpPr/>
+      <p:sp>
+        <p:nvSpPr>
+          <p:cNvPr id="2" name="Title 1"/>
+          <p:cNvSpPr>
+            <a:spLocks noGrp="1"/>
+          </p:cNvSpPr>
+          <p:nvPr>
+            <p:ph type="title"/>
+          </p:nvPr>
+        </p:nvSpPr>
+        <p:spPr/>
+        <p:txBody>
+          <a:bodyPr/>
+          <a:lstStyle/>
+          <a:p>
+            <a:r>
+              <a:t>Are you ready to RUUUMBLE?! - Python vs JavaScript</a:t>
+            </a:r>
+          </a:p>
+        </p:txBody>
+      </p:sp>
+      <p:sp>
+        <p:nvSpPr>
+          <p:cNvPr id="3" name="TextBox 2"/>
+          <p:cNvSpPr txBox="1"/>
+          <p:nvPr/>
+        </p:nvSpPr>
+        <p:spPr>
+          <a:xfrm>
+            <a:off x="3017520" y="1828800"/>
+            <a:ext cx="914400" cy="914400"/>
+          </a:xfrm>
+          <a:prstGeom prst="rect">
+            <a:avLst/>
+          </a:prstGeom>
+          <a:noFill/>
+        </p:spPr>
+        <p:txBody>
+          <a:bodyPr wrap="none">
+            <a:spAutoFit/>
+          </a:bodyPr>
+          <a:lstStyle/>
+          <a:p/>
+          <a:p>
+            <a:pPr>
+              <a:defRPr b="1" sz="3000"/>
+            </a:pPr>
+            <a:r>
+              <a:t>Defining Variables</a:t>
+            </a:r>
+          </a:p>
+        </p:txBody>
+      </p:sp>
+      <p:pic>
+        <p:nvPicPr>
+          <p:cNvPr id="4" name="Picture 3" descr="variables_js.PNG"/>
+          <p:cNvPicPr>
+            <a:picLocks noChangeAspect="1"/>
+          </p:cNvPicPr>
+          <p:nvPr/>
+        </p:nvPicPr>
+        <p:blipFill>
+          <a:blip r:embed="rId2"/>
+          <a:stretch>
+            <a:fillRect/>
+          </a:stretch>
+        </p:blipFill>
+        <p:spPr>
+          <a:xfrm>
+            <a:off x="2468880" y="3200400"/>
+            <a:ext cx="4000500" cy="885825"/>
+          </a:xfrm>
+          <a:prstGeom prst="rect">
+            <a:avLst/>
+          </a:prstGeom>
+        </p:spPr>
+      </p:pic>
+      <p:pic>
+        <p:nvPicPr>
+          <p:cNvPr id="5" name="Picture 4" descr="variables_py.PNG"/>
+          <p:cNvPicPr>
+            <a:picLocks noChangeAspect="1"/>
+          </p:cNvPicPr>
+          <p:nvPr/>
+        </p:nvPicPr>
+        <p:blipFill>
+          <a:blip r:embed="rId3"/>
+          <a:stretch>
+            <a:fillRect/>
+          </a:stretch>
+        </p:blipFill>
+        <p:spPr>
+          <a:xfrm>
+            <a:off x="2926080" y="4572000"/>
+            <a:ext cx="3133725" cy="800100"/>
+          </a:xfrm>
+          <a:prstGeom prst="rect">
+            <a:avLst/>
+          </a:prstGeom>
+        </p:spPr>
+      </p:pic>
+    </p:spTree>
+  </p:cSld>
+  <p:clrMapOvr>
+    <a:masterClrMapping/>
+  </p:clrMapOvr>
+</p:sld>
+</file>
+
+<file path=ppt/slides/slide6.xml><?xml version="1.0" encoding="utf-8"?>
+<p:sld xmlns:a="http://schemas.openxmlformats.org/drawingml/2006/main" xmlns:p="http://schemas.openxmlformats.org/presentationml/2006/main" xmlns:r="http://schemas.openxmlformats.org/officeDocument/2006/relationships">
+  <p:cSld>
+    <p:bg>
+      <p:bgPr>
+        <a:solidFill>
+          <a:srgbClr val="FDEFB4"/>
+        </a:solidFill>
+        <a:effectLst/>
+      </p:bgPr>
+    </p:bg>
+    <p:spTree>
+      <p:nvGrpSpPr>
+        <p:cNvPr id="1" name=""/>
+        <p:cNvGrpSpPr/>
+        <p:nvPr/>
+      </p:nvGrpSpPr>
+      <p:grpSpPr/>
+      <p:sp>
+        <p:nvSpPr>
+          <p:cNvPr id="2" name="Title 1"/>
+          <p:cNvSpPr>
+            <a:spLocks noGrp="1"/>
+          </p:cNvSpPr>
+          <p:nvPr>
+            <p:ph type="title"/>
+          </p:nvPr>
+        </p:nvSpPr>
+        <p:spPr/>
+        <p:txBody>
+          <a:bodyPr/>
+          <a:lstStyle/>
+          <a:p>
+            <a:r>
+              <a:t>Are you ready to RUUUMBLE?! - Python vs JavaScript</a:t>
+            </a:r>
+          </a:p>
+        </p:txBody>
+      </p:sp>
+      <p:sp>
+        <p:nvSpPr>
+          <p:cNvPr id="3" name="TextBox 2"/>
+          <p:cNvSpPr txBox="1"/>
+          <p:nvPr/>
+        </p:nvSpPr>
+        <p:spPr>
+          <a:xfrm>
+            <a:off x="3383280" y="1828800"/>
+            <a:ext cx="914400" cy="914400"/>
+          </a:xfrm>
+          <a:prstGeom prst="rect">
+            <a:avLst/>
+          </a:prstGeom>
+          <a:noFill/>
+        </p:spPr>
+        <p:txBody>
+          <a:bodyPr wrap="none">
+            <a:spAutoFit/>
+          </a:bodyPr>
+          <a:lstStyle/>
+          <a:p/>
+          <a:p>
+            <a:pPr>
+              <a:defRPr b="1" sz="3000"/>
+            </a:pPr>
+            <a:r>
+              <a:t>FOR Loops</a:t>
+            </a:r>
+          </a:p>
+        </p:txBody>
+      </p:sp>
+      <p:pic>
+        <p:nvPicPr>
+          <p:cNvPr id="4" name="Picture 3" descr="for_loop_js.PNG"/>
+          <p:cNvPicPr>
+            <a:picLocks noChangeAspect="1"/>
+          </p:cNvPicPr>
+          <p:nvPr/>
+        </p:nvPicPr>
+        <p:blipFill>
+          <a:blip r:embed="rId2"/>
+          <a:stretch>
+            <a:fillRect/>
+          </a:stretch>
+        </p:blipFill>
+        <p:spPr>
+          <a:xfrm>
+            <a:off x="1097280" y="3017520"/>
+            <a:ext cx="3771900" cy="2047875"/>
+          </a:xfrm>
+          <a:prstGeom prst="rect">
+            <a:avLst/>
+          </a:prstGeom>
+        </p:spPr>
+      </p:pic>
+      <p:pic>
+        <p:nvPicPr>
+          <p:cNvPr id="5" name="Picture 4" descr="for_loop_py.PNG"/>
+          <p:cNvPicPr>
+            <a:picLocks noChangeAspect="1"/>
+          </p:cNvPicPr>
+          <p:nvPr/>
+        </p:nvPicPr>
+        <p:blipFill>
+          <a:blip r:embed="rId3"/>
+          <a:stretch>
+            <a:fillRect/>
+          </a:stretch>
+        </p:blipFill>
+        <p:spPr>
+          <a:xfrm>
+            <a:off x="5029200" y="3017520"/>
+            <a:ext cx="2438400" cy="2200275"/>
+          </a:xfrm>
+          <a:prstGeom prst="rect">
+            <a:avLst/>
+          </a:prstGeom>
+        </p:spPr>
+      </p:pic>
+    </p:spTree>
+  </p:cSld>
+  <p:clrMapOvr>
+    <a:masterClrMapping/>
+  </p:clrMapOvr>
+</p:sld>
+</file>
+
+<file path=ppt/slides/slide7.xml><?xml version="1.0" encoding="utf-8"?>
+<p:sld xmlns:a="http://schemas.openxmlformats.org/drawingml/2006/main" xmlns:p="http://schemas.openxmlformats.org/presentationml/2006/main" xmlns:r="http://schemas.openxmlformats.org/officeDocument/2006/relationships">
+  <p:cSld>
+    <p:bg>
+      <p:bgPr>
+        <a:solidFill>
+          <a:srgbClr val="B4CEE4"/>
+        </a:solidFill>
+        <a:effectLst/>
+      </p:bgPr>
+    </p:bg>
+    <p:spTree>
+      <p:nvGrpSpPr>
+        <p:cNvPr id="1" name=""/>
+        <p:cNvGrpSpPr/>
+        <p:nvPr/>
+      </p:nvGrpSpPr>
+      <p:grpSpPr/>
+      <p:sp>
+        <p:nvSpPr>
+          <p:cNvPr id="2" name="Title 1"/>
+          <p:cNvSpPr>
+            <a:spLocks noGrp="1"/>
+          </p:cNvSpPr>
+          <p:nvPr>
+            <p:ph type="title"/>
+          </p:nvPr>
+        </p:nvSpPr>
+        <p:spPr/>
+        <p:txBody>
+          <a:bodyPr/>
+          <a:lstStyle/>
+          <a:p>
+            <a:r>
+              <a:t>Are you ready to RUUUMBLE?! - Python vs JavaScript</a:t>
+            </a:r>
+          </a:p>
+        </p:txBody>
+      </p:sp>
+      <p:sp>
+        <p:nvSpPr>
+          <p:cNvPr id="3" name="TextBox 2"/>
+          <p:cNvSpPr txBox="1"/>
+          <p:nvPr/>
+        </p:nvSpPr>
+        <p:spPr>
+          <a:xfrm>
+            <a:off x="3017520" y="1828800"/>
+            <a:ext cx="914400" cy="914400"/>
+          </a:xfrm>
+          <a:prstGeom prst="rect">
+            <a:avLst/>
+          </a:prstGeom>
+          <a:noFill/>
+        </p:spPr>
+        <p:txBody>
+          <a:bodyPr wrap="none">
+            <a:spAutoFit/>
+          </a:bodyPr>
+          <a:lstStyle/>
+          <a:p/>
+          <a:p>
+            <a:pPr>
+              <a:defRPr b="1" sz="3000"/>
+            </a:pPr>
+            <a:r>
+              <a:t>if/else Statements</a:t>
+            </a:r>
+          </a:p>
+        </p:txBody>
+      </p:sp>
+      <p:pic>
+        <p:nvPicPr>
+          <p:cNvPr id="4" name="Picture 3" descr="if_else_js.PNG"/>
+          <p:cNvPicPr>
+            <a:picLocks noChangeAspect="1"/>
+          </p:cNvPicPr>
+          <p:nvPr/>
+        </p:nvPicPr>
+        <p:blipFill>
+          <a:blip r:embed="rId2"/>
+          <a:stretch>
+            <a:fillRect/>
+          </a:stretch>
+        </p:blipFill>
+        <p:spPr>
+          <a:xfrm>
+            <a:off x="731520" y="3017520"/>
+            <a:ext cx="4057650" cy="2162175"/>
+          </a:xfrm>
+          <a:prstGeom prst="rect">
+            <a:avLst/>
+          </a:prstGeom>
+        </p:spPr>
+      </p:pic>
+      <p:pic>
+        <p:nvPicPr>
+          <p:cNvPr id="5" name="Picture 4" descr="if_else_py.PNG"/>
+          <p:cNvPicPr>
+            <a:picLocks noChangeAspect="1"/>
+          </p:cNvPicPr>
+          <p:nvPr/>
+        </p:nvPicPr>
+        <p:blipFill>
+          <a:blip r:embed="rId3"/>
+          <a:stretch>
+            <a:fillRect/>
+          </a:stretch>
+        </p:blipFill>
+        <p:spPr>
+          <a:xfrm>
+            <a:off x="5029200" y="3017520"/>
+            <a:ext cx="3400425" cy="2009775"/>
+          </a:xfrm>
+          <a:prstGeom prst="rect">
+            <a:avLst/>
+          </a:prstGeom>
+        </p:spPr>
+      </p:pic>
+    </p:spTree>
+  </p:cSld>
+  <p:clrMapOvr>
+    <a:masterClrMapping/>
+  </p:clrMapOvr>
+</p:sld>
+</file>
+
+<file path=ppt/slides/slide8.xml><?xml version="1.0" encoding="utf-8"?>
+<p:sld xmlns:a="http://schemas.openxmlformats.org/drawingml/2006/main" xmlns:p="http://schemas.openxmlformats.org/presentationml/2006/main" xmlns:r="http://schemas.openxmlformats.org/officeDocument/2006/relationships">
+  <p:cSld>
+    <p:bg>
+      <p:bgPr>
+        <a:solidFill>
+          <a:srgbClr val="FDEFB4"/>
+        </a:solidFill>
+        <a:effectLst/>
+      </p:bgPr>
+    </p:bg>
+    <p:spTree>
+      <p:nvGrpSpPr>
+        <p:cNvPr id="1" name=""/>
+        <p:cNvGrpSpPr/>
+        <p:nvPr/>
+      </p:nvGrpSpPr>
+      <p:grpSpPr/>
+      <p:sp>
+        <p:nvSpPr>
+          <p:cNvPr id="2" name="Title 1"/>
+          <p:cNvSpPr>
+            <a:spLocks noGrp="1"/>
+          </p:cNvSpPr>
+          <p:nvPr>
+            <p:ph type="title"/>
+          </p:nvPr>
+        </p:nvSpPr>
+        <p:spPr/>
+        <p:txBody>
+          <a:bodyPr/>
+          <a:lstStyle/>
+          <a:p>
+            <a:r>
+              <a:t>Are you ready to RUUUMBLE?! - Python vs JavaScript</a:t>
+            </a:r>
+          </a:p>
+        </p:txBody>
+      </p:sp>
+      <p:sp>
+        <p:nvSpPr>
+          <p:cNvPr id="3" name="TextBox 2"/>
+          <p:cNvSpPr txBox="1"/>
+          <p:nvPr/>
+        </p:nvSpPr>
+        <p:spPr>
+          <a:xfrm>
+            <a:off x="3474720" y="1280160"/>
+            <a:ext cx="914400" cy="914400"/>
+          </a:xfrm>
+          <a:prstGeom prst="rect">
+            <a:avLst/>
+          </a:prstGeom>
+          <a:noFill/>
+        </p:spPr>
+        <p:txBody>
+          <a:bodyPr wrap="none">
+            <a:spAutoFit/>
+          </a:bodyPr>
+          <a:lstStyle/>
+          <a:p/>
+          <a:p>
+            <a:pPr>
+              <a:defRPr b="1" sz="3000"/>
+            </a:pPr>
+            <a:r>
+              <a:t>Functions</a:t>
+            </a:r>
+          </a:p>
+        </p:txBody>
+      </p:sp>
+      <p:pic>
+        <p:nvPicPr>
+          <p:cNvPr id="4" name="Picture 3" descr="functions_js.PNG"/>
+          <p:cNvPicPr>
+            <a:picLocks noChangeAspect="1"/>
+          </p:cNvPicPr>
+          <p:nvPr/>
+        </p:nvPicPr>
+        <p:blipFill>
+          <a:blip r:embed="rId2"/>
+          <a:stretch>
+            <a:fillRect/>
+          </a:stretch>
+        </p:blipFill>
+        <p:spPr>
+          <a:xfrm>
+            <a:off x="1554480" y="2103120"/>
+            <a:ext cx="5810250" cy="2266950"/>
+          </a:xfrm>
+          <a:prstGeom prst="rect">
+            <a:avLst/>
+          </a:prstGeom>
+        </p:spPr>
+      </p:pic>
+      <p:pic>
+        <p:nvPicPr>
+          <p:cNvPr id="5" name="Picture 4" descr="functions_py.PNG"/>
+          <p:cNvPicPr>
+            <a:picLocks noChangeAspect="1"/>
+          </p:cNvPicPr>
+          <p:nvPr/>
+        </p:nvPicPr>
+        <p:blipFill>
+          <a:blip r:embed="rId3"/>
+          <a:stretch>
+            <a:fillRect/>
+          </a:stretch>
+        </p:blipFill>
+        <p:spPr>
+          <a:xfrm>
+            <a:off x="1920240" y="4572000"/>
+            <a:ext cx="5086350" cy="1743075"/>
+          </a:xfrm>
+          <a:prstGeom prst="rect">
+            <a:avLst/>
+          </a:prstGeom>
+        </p:spPr>
+      </p:pic>
+    </p:spTree>
+  </p:cSld>
+  <p:clrMapOvr>
+    <a:masterClrMapping/>
+  </p:clrMapOvr>
+</p:sld>
+</file>
+
+<file path=ppt/slides/slide9.xml><?xml version="1.0" encoding="utf-8"?>
+<p:sld xmlns:a="http://schemas.openxmlformats.org/drawingml/2006/main" xmlns:p="http://schemas.openxmlformats.org/presentationml/2006/main" xmlns:r="http://schemas.openxmlformats.org/officeDocument/2006/relationships">
+  <p:cSld>
+    <p:bg>
+      <p:bgPr>
+        <a:solidFill>
+          <a:srgbClr val="B4CEE4"/>
+        </a:solidFill>
+        <a:effectLst/>
+      </p:bgPr>
+    </p:bg>
+    <p:spTree>
+      <p:nvGrpSpPr>
+        <p:cNvPr id="1" name=""/>
+        <p:cNvGrpSpPr/>
+        <p:nvPr/>
+      </p:nvGrpSpPr>
+      <p:grpSpPr/>
+      <p:sp>
+        <p:nvSpPr>
+          <p:cNvPr id="2" name="Title 1"/>
+          <p:cNvSpPr>
+            <a:spLocks noGrp="1"/>
+          </p:cNvSpPr>
+          <p:nvPr>
+            <p:ph type="title"/>
+          </p:nvPr>
+        </p:nvSpPr>
+        <p:spPr/>
+        <p:txBody>
+          <a:bodyPr/>
+          <a:lstStyle/>
+          <a:p>
+            <a:r>
               <a:t>And now, for something completely different...</a:t>
             </a:r>
           </a:p>
         </p:txBody>
       </p:sp>
+      <p:pic>
+        <p:nvPicPr>
+          <p:cNvPr id="3" name="Picture 2" descr="python_meme.jpg"/>
+          <p:cNvPicPr>
+            <a:picLocks noChangeAspect="1"/>
+          </p:cNvPicPr>
+          <p:nvPr/>
+        </p:nvPicPr>
+        <p:blipFill>
+          <a:blip r:embed="rId2"/>
+          <a:stretch>
+            <a:fillRect/>
+          </a:stretch>
+        </p:blipFill>
+        <p:spPr>
+          <a:xfrm>
+            <a:off x="457200" y="1645920"/>
+            <a:ext cx="3657600" cy="4876800"/>
+          </a:xfrm>
+          <a:prstGeom prst="rect">
+            <a:avLst/>
+          </a:prstGeom>
+        </p:spPr>
+      </p:pic>
+      <p:pic>
+        <p:nvPicPr>
+          <p:cNvPr id="4" name="Picture 3" descr="python_meme(1.1).jpg"/>
+          <p:cNvPicPr>
+            <a:picLocks noChangeAspect="1"/>
+          </p:cNvPicPr>
+          <p:nvPr/>
+        </p:nvPicPr>
+        <p:blipFill>
+          <a:blip r:embed="rId3"/>
+          <a:stretch>
+            <a:fillRect/>
+          </a:stretch>
+        </p:blipFill>
+        <p:spPr>
+          <a:xfrm>
+            <a:off x="5943600" y="1645920"/>
+            <a:ext cx="2400300" cy="1971675"/>
+          </a:xfrm>
+          <a:prstGeom prst="rect">
+            <a:avLst/>
+          </a:prstGeom>
+        </p:spPr>
+      </p:pic>
+      <p:pic>
+        <p:nvPicPr>
+          <p:cNvPr id="5" name="Picture 4" descr="python_meme(2.1).jpg"/>
+          <p:cNvPicPr>
+            <a:picLocks noChangeAspect="1"/>
+          </p:cNvPicPr>
+          <p:nvPr/>
+        </p:nvPicPr>
+        <p:blipFill>
+          <a:blip r:embed="rId4"/>
+          <a:stretch>
+            <a:fillRect/>
+          </a:stretch>
+        </p:blipFill>
+        <p:spPr>
+          <a:xfrm>
+            <a:off x="3931920" y="2743200"/>
+            <a:ext cx="1885950" cy="1885950"/>
+          </a:xfrm>
+          <a:prstGeom prst="rect">
+            <a:avLst/>
+          </a:prstGeom>
+        </p:spPr>
+      </p:pic>
+      <p:pic>
+        <p:nvPicPr>
+          <p:cNvPr id="6" name="Picture 5" descr="python_meme(3.1).png"/>
+          <p:cNvPicPr>
+            <a:picLocks noChangeAspect="1"/>
+          </p:cNvPicPr>
+          <p:nvPr/>
+        </p:nvPicPr>
+        <p:blipFill>
+          <a:blip r:embed="rId5"/>
+          <a:stretch>
+            <a:fillRect/>
+          </a:stretch>
+        </p:blipFill>
+        <p:spPr>
+          <a:xfrm>
+            <a:off x="5943600" y="4114800"/>
+            <a:ext cx="2540000" cy="2184400"/>
+          </a:xfrm>
+          <a:prstGeom prst="rect">
+            <a:avLst/>
+          </a:prstGeom>
+        </p:spPr>
+      </p:pic>
     </p:spTree>
   </p:cSld>
   <p:clrMapOvr>

</xml_diff>

<commit_message>
updated img folder, corrected final slide background error
</commit_message>
<xml_diff>
--- a/CN_PPT_Sofia.pptx
+++ b/CN_PPT_Sofia.pptx
@@ -4091,7 +4091,7 @@
       </p:sp>
       <p:pic>
         <p:nvPicPr>
-          <p:cNvPr id="3" name="Picture 2" descr="python_meme.jpg"/>
+          <p:cNvPr id="3" name="Picture 2" descr="python_meme1.jpg"/>
           <p:cNvPicPr>
             <a:picLocks noChangeAspect="1"/>
           </p:cNvPicPr>
@@ -4115,7 +4115,7 @@
       </p:pic>
       <p:pic>
         <p:nvPicPr>
-          <p:cNvPr id="4" name="Picture 3" descr="python_meme(1.1).jpg"/>
+          <p:cNvPr id="4" name="Picture 3" descr="python_meme2.jpg"/>
           <p:cNvPicPr>
             <a:picLocks noChangeAspect="1"/>
           </p:cNvPicPr>
@@ -4139,7 +4139,7 @@
       </p:pic>
       <p:pic>
         <p:nvPicPr>
-          <p:cNvPr id="5" name="Picture 4" descr="python_meme(2.1).jpg"/>
+          <p:cNvPr id="5" name="Picture 4" descr="python_meme3.jpg"/>
           <p:cNvPicPr>
             <a:picLocks noChangeAspect="1"/>
           </p:cNvPicPr>
@@ -4163,7 +4163,7 @@
       </p:pic>
       <p:pic>
         <p:nvPicPr>
-          <p:cNvPr id="6" name="Picture 5" descr="python_meme(3.1).png"/>
+          <p:cNvPr id="6" name="Picture 5" descr="python_meme4.png"/>
           <p:cNvPicPr>
             <a:picLocks noChangeAspect="1"/>
           </p:cNvPicPr>

</xml_diff>